<commit_message>
Documentation Changes: Updated UI PPT File
</commit_message>
<xml_diff>
--- a/docs/diagrams/UiComponentClassDiagram.pptx
+++ b/docs/diagrams/UiComponentClassDiagram.pptx
@@ -126,6 +126,10 @@
 </p:presentation>
 </file>
 
+<file path=ppt/revisionInfo.xml><?xml version="1.0" encoding="utf-8"?>
+<p1510:revInfo xmlns:a="http://schemas.openxmlformats.org/drawingml/2006/main" xmlns:r="http://schemas.openxmlformats.org/officeDocument/2006/relationships" xmlns:p1510="http://schemas.microsoft.com/office/powerpoint/2015/10/main"/>
+</file>
+
 <file path=ppt/notesMasters/notesMaster1.xml><?xml version="1.0" encoding="utf-8"?>
 <p:notesMaster xmlns:a="http://schemas.openxmlformats.org/drawingml/2006/main" xmlns:r="http://schemas.openxmlformats.org/officeDocument/2006/relationships" xmlns:p="http://schemas.openxmlformats.org/presentationml/2006/main">
   <p:cSld>
@@ -208,7 +212,7 @@
           <a:p>
             <a:fld id="{F5CC4B3F-88C1-4FFA-B1B6-F41C21DC6924}" type="datetimeFigureOut">
               <a:rPr lang="en-US" smtClean="0"/>
-              <a:t>1/7/2017</a:t>
+              <a:t>10/18/2017</a:t>
             </a:fld>
             <a:endParaRPr lang="en-US"/>
           </a:p>
@@ -654,7 +658,7 @@
           <a:p>
             <a:fld id="{78C97017-6FC3-485B-9764-EAC9E56C1D49}" type="datetimeFigureOut">
               <a:rPr lang="en-US" smtClean="0"/>
-              <a:t>1/7/2017</a:t>
+              <a:t>10/18/2017</a:t>
             </a:fld>
             <a:endParaRPr lang="en-US"/>
           </a:p>
@@ -822,7 +826,7 @@
           <a:p>
             <a:fld id="{78C97017-6FC3-485B-9764-EAC9E56C1D49}" type="datetimeFigureOut">
               <a:rPr lang="en-US" smtClean="0"/>
-              <a:t>1/7/2017</a:t>
+              <a:t>10/18/2017</a:t>
             </a:fld>
             <a:endParaRPr lang="en-US"/>
           </a:p>
@@ -1000,7 +1004,7 @@
           <a:p>
             <a:fld id="{78C97017-6FC3-485B-9764-EAC9E56C1D49}" type="datetimeFigureOut">
               <a:rPr lang="en-US" smtClean="0"/>
-              <a:t>1/7/2017</a:t>
+              <a:t>10/18/2017</a:t>
             </a:fld>
             <a:endParaRPr lang="en-US"/>
           </a:p>
@@ -1168,7 +1172,7 @@
           <a:p>
             <a:fld id="{78C97017-6FC3-485B-9764-EAC9E56C1D49}" type="datetimeFigureOut">
               <a:rPr lang="en-US" smtClean="0"/>
-              <a:t>1/7/2017</a:t>
+              <a:t>10/18/2017</a:t>
             </a:fld>
             <a:endParaRPr lang="en-US"/>
           </a:p>
@@ -1413,7 +1417,7 @@
           <a:p>
             <a:fld id="{78C97017-6FC3-485B-9764-EAC9E56C1D49}" type="datetimeFigureOut">
               <a:rPr lang="en-US" smtClean="0"/>
-              <a:t>1/7/2017</a:t>
+              <a:t>10/18/2017</a:t>
             </a:fld>
             <a:endParaRPr lang="en-US"/>
           </a:p>
@@ -1698,7 +1702,7 @@
           <a:p>
             <a:fld id="{78C97017-6FC3-485B-9764-EAC9E56C1D49}" type="datetimeFigureOut">
               <a:rPr lang="en-US" smtClean="0"/>
-              <a:t>1/7/2017</a:t>
+              <a:t>10/18/2017</a:t>
             </a:fld>
             <a:endParaRPr lang="en-US"/>
           </a:p>
@@ -2117,7 +2121,7 @@
           <a:p>
             <a:fld id="{78C97017-6FC3-485B-9764-EAC9E56C1D49}" type="datetimeFigureOut">
               <a:rPr lang="en-US" smtClean="0"/>
-              <a:t>1/7/2017</a:t>
+              <a:t>10/18/2017</a:t>
             </a:fld>
             <a:endParaRPr lang="en-US"/>
           </a:p>
@@ -2234,7 +2238,7 @@
           <a:p>
             <a:fld id="{78C97017-6FC3-485B-9764-EAC9E56C1D49}" type="datetimeFigureOut">
               <a:rPr lang="en-US" smtClean="0"/>
-              <a:t>1/7/2017</a:t>
+              <a:t>10/18/2017</a:t>
             </a:fld>
             <a:endParaRPr lang="en-US"/>
           </a:p>
@@ -2329,7 +2333,7 @@
           <a:p>
             <a:fld id="{78C97017-6FC3-485B-9764-EAC9E56C1D49}" type="datetimeFigureOut">
               <a:rPr lang="en-US" smtClean="0"/>
-              <a:t>1/7/2017</a:t>
+              <a:t>10/18/2017</a:t>
             </a:fld>
             <a:endParaRPr lang="en-US"/>
           </a:p>
@@ -2604,7 +2608,7 @@
           <a:p>
             <a:fld id="{78C97017-6FC3-485B-9764-EAC9E56C1D49}" type="datetimeFigureOut">
               <a:rPr lang="en-US" smtClean="0"/>
-              <a:t>1/7/2017</a:t>
+              <a:t>10/18/2017</a:t>
             </a:fld>
             <a:endParaRPr lang="en-US"/>
           </a:p>
@@ -2856,7 +2860,7 @@
           <a:p>
             <a:fld id="{78C97017-6FC3-485B-9764-EAC9E56C1D49}" type="datetimeFigureOut">
               <a:rPr lang="en-US" smtClean="0"/>
-              <a:t>1/7/2017</a:t>
+              <a:t>10/18/2017</a:t>
             </a:fld>
             <a:endParaRPr lang="en-US"/>
           </a:p>
@@ -3067,7 +3071,7 @@
           <a:p>
             <a:fld id="{78C97017-6FC3-485B-9764-EAC9E56C1D49}" type="datetimeFigureOut">
               <a:rPr lang="en-US" smtClean="0"/>
-              <a:t>1/7/2017</a:t>
+              <a:t>10/18/2017</a:t>
             </a:fld>
             <a:endParaRPr lang="en-US"/>
           </a:p>
@@ -3450,7 +3454,7 @@
         </p:nvSpPr>
         <p:spPr>
           <a:xfrm>
-            <a:off x="1217465" y="1447800"/>
+            <a:off x="685800" y="152400"/>
             <a:ext cx="4917083" cy="3962400"/>
           </a:xfrm>
           <a:prstGeom prst="roundRect">
@@ -3512,7 +3516,7 @@
         </p:nvSpPr>
         <p:spPr>
           <a:xfrm>
-            <a:off x="2095948" y="2341220"/>
+            <a:off x="1564283" y="1045820"/>
             <a:ext cx="1093635" cy="346760"/>
           </a:xfrm>
           <a:prstGeom prst="rect">
@@ -3545,7 +3549,7 @@
           <a:p>
             <a:pPr algn="ctr"/>
             <a:r>
-              <a:rPr lang="en-US" sz="1050" b="1" dirty="0" err="1">
+              <a:rPr lang="en-US" sz="1050" b="1" dirty="0">
                 <a:solidFill>
                   <a:schemeClr val="accent3">
                     <a:lumMod val="75000"/>
@@ -3572,7 +3576,7 @@
         </p:nvSpPr>
         <p:spPr>
           <a:xfrm>
-            <a:off x="2592528" y="2971800"/>
+            <a:off x="2060863" y="1676400"/>
             <a:ext cx="1093635" cy="236841"/>
           </a:xfrm>
           <a:prstGeom prst="rect">
@@ -3605,7 +3609,7 @@
           <a:p>
             <a:pPr algn="ctr"/>
             <a:r>
-              <a:rPr lang="en-US" sz="1050" b="1" dirty="0" err="1">
+              <a:rPr lang="en-US" sz="1050" b="1" dirty="0">
                 <a:solidFill>
                   <a:schemeClr val="accent3">
                     <a:lumMod val="75000"/>
@@ -3632,7 +3636,7 @@
         </p:nvSpPr>
         <p:spPr>
           <a:xfrm>
-            <a:off x="2092842" y="1770924"/>
+            <a:off x="1561177" y="475524"/>
             <a:ext cx="1093635" cy="346760"/>
           </a:xfrm>
           <a:prstGeom prst="rect">
@@ -3694,7 +3698,7 @@
         </p:nvCxnSpPr>
         <p:spPr>
           <a:xfrm rot="16200000" flipH="1">
-            <a:off x="2529445" y="2227899"/>
+            <a:off x="1997780" y="932499"/>
             <a:ext cx="223536" cy="3106"/>
           </a:xfrm>
           <a:prstGeom prst="bentConnector3">
@@ -3734,7 +3738,7 @@
         </p:nvSpPr>
         <p:spPr>
           <a:xfrm rot="10800000" flipV="1">
-            <a:off x="5394717" y="2110477"/>
+            <a:off x="4863052" y="815077"/>
             <a:ext cx="270504" cy="175523"/>
           </a:xfrm>
           <a:prstGeom prst="triangle">
@@ -3777,12 +3781,14 @@
       <p:cxnSp>
         <p:nvCxnSpPr>
           <p:cNvPr id="19" name="Elbow Connector 122"/>
-          <p:cNvCxnSpPr/>
+          <p:cNvCxnSpPr>
+            <a:cxnSpLocks/>
+          </p:cNvCxnSpPr>
           <p:nvPr/>
         </p:nvCxnSpPr>
         <p:spPr>
           <a:xfrm flipV="1">
-            <a:off x="644735" y="2991937"/>
+            <a:off x="113070" y="1696537"/>
             <a:ext cx="684904" cy="1"/>
           </a:xfrm>
           <a:prstGeom prst="bentConnector3">
@@ -3825,7 +3831,7 @@
         </p:nvSpPr>
         <p:spPr>
           <a:xfrm rot="16200000">
-            <a:off x="5703829" y="2464877"/>
+            <a:off x="5172164" y="1169477"/>
             <a:ext cx="2362201" cy="328045"/>
           </a:xfrm>
           <a:prstGeom prst="roundRect">
@@ -3885,7 +3891,7 @@
         </p:nvSpPr>
         <p:spPr>
           <a:xfrm>
-            <a:off x="2592528" y="3649359"/>
+            <a:off x="2060863" y="2353959"/>
             <a:ext cx="1093635" cy="236841"/>
           </a:xfrm>
           <a:prstGeom prst="rect">
@@ -3918,14 +3924,14 @@
           <a:p>
             <a:pPr algn="ctr"/>
             <a:r>
-              <a:rPr lang="en-US" sz="1050" b="1" dirty="0" err="1">
+              <a:rPr lang="en-US" sz="1050" b="1" dirty="0">
                 <a:solidFill>
                   <a:schemeClr val="accent3">
                     <a:lumMod val="75000"/>
                   </a:schemeClr>
                 </a:solidFill>
               </a:rPr>
-              <a:t>BrowserPanel</a:t>
+              <a:t>PersonPanel</a:t>
             </a:r>
             <a:endParaRPr lang="en-SG" sz="1050" b="1" dirty="0">
               <a:solidFill>
@@ -3945,7 +3951,7 @@
         </p:nvSpPr>
         <p:spPr>
           <a:xfrm>
-            <a:off x="2592527" y="4563759"/>
+            <a:off x="2060862" y="3268359"/>
             <a:ext cx="1093635" cy="236841"/>
           </a:xfrm>
           <a:prstGeom prst="rect">
@@ -3978,7 +3984,7 @@
           <a:p>
             <a:pPr algn="ctr"/>
             <a:r>
-              <a:rPr lang="en-US" sz="1050" b="1" dirty="0" err="1">
+              <a:rPr lang="en-US" sz="1050" b="1" dirty="0">
                 <a:solidFill>
                   <a:schemeClr val="accent3">
                     <a:lumMod val="75000"/>
@@ -4005,7 +4011,7 @@
         </p:nvSpPr>
         <p:spPr>
           <a:xfrm>
-            <a:off x="2592526" y="3991960"/>
+            <a:off x="2060861" y="2696560"/>
             <a:ext cx="1093635" cy="236841"/>
           </a:xfrm>
           <a:prstGeom prst="rect">
@@ -4038,7 +4044,7 @@
           <a:p>
             <a:pPr algn="ctr"/>
             <a:r>
-              <a:rPr lang="en-US" sz="1050" b="1" dirty="0" err="1">
+              <a:rPr lang="en-US" sz="1050" b="1" dirty="0">
                 <a:solidFill>
                   <a:schemeClr val="accent3">
                     <a:lumMod val="75000"/>
@@ -4065,7 +4071,7 @@
         </p:nvSpPr>
         <p:spPr>
           <a:xfrm>
-            <a:off x="3839323" y="4228801"/>
+            <a:off x="3307658" y="2933401"/>
             <a:ext cx="1040906" cy="236841"/>
           </a:xfrm>
           <a:prstGeom prst="rect">
@@ -4098,7 +4104,7 @@
           <a:p>
             <a:pPr algn="ctr"/>
             <a:r>
-              <a:rPr lang="en-US" sz="1050" b="1" dirty="0" err="1">
+              <a:rPr lang="en-US" sz="1050" b="1" dirty="0">
                 <a:solidFill>
                   <a:schemeClr val="accent3">
                     <a:lumMod val="75000"/>
@@ -4125,7 +4131,7 @@
         </p:nvSpPr>
         <p:spPr>
           <a:xfrm>
-            <a:off x="2592528" y="4966000"/>
+            <a:off x="2060863" y="3670600"/>
             <a:ext cx="1093635" cy="236841"/>
           </a:xfrm>
           <a:prstGeom prst="rect">
@@ -4158,7 +4164,7 @@
           <a:p>
             <a:pPr algn="ctr"/>
             <a:r>
-              <a:rPr lang="en-US" sz="1050" b="1" dirty="0" err="1">
+              <a:rPr lang="en-US" sz="1050" b="1" dirty="0">
                 <a:solidFill>
                   <a:schemeClr val="accent3">
                     <a:lumMod val="75000"/>
@@ -4185,7 +4191,7 @@
         </p:nvSpPr>
         <p:spPr>
           <a:xfrm>
-            <a:off x="2324548" y="2706452"/>
+            <a:off x="1792883" y="1411052"/>
             <a:ext cx="183156" cy="161573"/>
           </a:xfrm>
           <a:prstGeom prst="flowChartDecision">
@@ -4236,7 +4242,7 @@
         </p:nvCxnSpPr>
         <p:spPr>
           <a:xfrm rot="16200000" flipH="1">
-            <a:off x="2393229" y="2890922"/>
+            <a:off x="1861564" y="1595522"/>
             <a:ext cx="222196" cy="176402"/>
           </a:xfrm>
           <a:prstGeom prst="bentConnector2">
@@ -4274,7 +4280,7 @@
         </p:nvSpPr>
         <p:spPr>
           <a:xfrm>
-            <a:off x="2590799" y="3304308"/>
+            <a:off x="2059134" y="2008908"/>
             <a:ext cx="1095361" cy="236841"/>
           </a:xfrm>
           <a:prstGeom prst="rect">
@@ -4307,7 +4313,7 @@
           <a:p>
             <a:pPr algn="ctr"/>
             <a:r>
-              <a:rPr lang="en-US" sz="1050" b="1" dirty="0" err="1">
+              <a:rPr lang="en-US" sz="1050" b="1" dirty="0">
                 <a:solidFill>
                   <a:schemeClr val="accent3">
                     <a:lumMod val="75000"/>
@@ -4337,7 +4343,7 @@
         </p:nvCxnSpPr>
         <p:spPr>
           <a:xfrm rot="16200000" flipH="1">
-            <a:off x="2054450" y="3229701"/>
+            <a:off x="1522785" y="1934301"/>
             <a:ext cx="899755" cy="176402"/>
           </a:xfrm>
           <a:prstGeom prst="bentConnector2">
@@ -4378,7 +4384,7 @@
         </p:nvCxnSpPr>
         <p:spPr>
           <a:xfrm rot="16200000" flipH="1">
-            <a:off x="1883148" y="3401003"/>
+            <a:off x="1351483" y="2105603"/>
             <a:ext cx="1242356" cy="176400"/>
           </a:xfrm>
           <a:prstGeom prst="bentConnector2">
@@ -4419,7 +4425,7 @@
         </p:nvCxnSpPr>
         <p:spPr>
           <a:xfrm rot="16200000" flipH="1">
-            <a:off x="1597249" y="3686901"/>
+            <a:off x="1065584" y="2391501"/>
             <a:ext cx="1814155" cy="176401"/>
           </a:xfrm>
           <a:prstGeom prst="bentConnector2">
@@ -4459,7 +4465,7 @@
         </p:nvCxnSpPr>
         <p:spPr>
           <a:xfrm rot="16200000" flipH="1">
-            <a:off x="1184119" y="3676012"/>
+            <a:off x="652454" y="2380612"/>
             <a:ext cx="2396440" cy="420377"/>
           </a:xfrm>
           <a:prstGeom prst="bentConnector2">
@@ -4497,7 +4503,7 @@
         </p:nvSpPr>
         <p:spPr>
           <a:xfrm>
-            <a:off x="5143948" y="1770924"/>
+            <a:off x="4612283" y="475524"/>
             <a:ext cx="772043" cy="346760"/>
           </a:xfrm>
           <a:prstGeom prst="rect">
@@ -4579,7 +4585,7 @@
         </p:nvCxnSpPr>
         <p:spPr>
           <a:xfrm flipV="1">
-            <a:off x="3686160" y="2286000"/>
+            <a:off x="3154495" y="990600"/>
             <a:ext cx="1843809" cy="1136729"/>
           </a:xfrm>
           <a:prstGeom prst="bentConnector2">
@@ -4620,7 +4626,7 @@
         </p:nvCxnSpPr>
         <p:spPr>
           <a:xfrm rot="5400000">
-            <a:off x="4174488" y="2991741"/>
+            <a:off x="3642823" y="1696341"/>
             <a:ext cx="2061222" cy="649740"/>
           </a:xfrm>
           <a:prstGeom prst="bentConnector2">
@@ -4661,7 +4667,7 @@
         </p:nvCxnSpPr>
         <p:spPr>
           <a:xfrm rot="5400000">
-            <a:off x="3867176" y="2104987"/>
+            <a:off x="3335511" y="809587"/>
             <a:ext cx="1481780" cy="1843806"/>
           </a:xfrm>
           <a:prstGeom prst="bentConnector2">
@@ -4702,7 +4708,7 @@
         </p:nvCxnSpPr>
         <p:spPr>
           <a:xfrm flipV="1">
-            <a:off x="3189583" y="2286000"/>
+            <a:off x="2657918" y="990600"/>
             <a:ext cx="2340386" cy="228600"/>
           </a:xfrm>
           <a:prstGeom prst="bentConnector2">
@@ -4743,7 +4749,7 @@
         </p:nvCxnSpPr>
         <p:spPr>
           <a:xfrm rot="5400000">
-            <a:off x="3409976" y="2562187"/>
+            <a:off x="2878311" y="1266787"/>
             <a:ext cx="2396180" cy="1843807"/>
           </a:xfrm>
           <a:prstGeom prst="bentConnector2">
@@ -4784,7 +4790,7 @@
         </p:nvCxnSpPr>
         <p:spPr>
           <a:xfrm rot="5400000">
-            <a:off x="3208856" y="2763307"/>
+            <a:off x="2677191" y="1467907"/>
             <a:ext cx="2798421" cy="1843806"/>
           </a:xfrm>
           <a:prstGeom prst="bentConnector2">
@@ -4824,7 +4830,7 @@
         </p:nvCxnSpPr>
         <p:spPr>
           <a:xfrm rot="5400000" flipH="1" flipV="1">
-            <a:off x="4594921" y="-355061"/>
+            <a:off x="4063256" y="-1650461"/>
             <a:ext cx="170724" cy="4081246"/>
           </a:xfrm>
           <a:prstGeom prst="bentConnector2">
@@ -4863,7 +4869,7 @@
         </p:nvSpPr>
         <p:spPr>
           <a:xfrm rot="16200000">
-            <a:off x="6213739" y="4560376"/>
+            <a:off x="5682074" y="3264976"/>
             <a:ext cx="1371599" cy="328045"/>
           </a:xfrm>
           <a:prstGeom prst="roundRect">
@@ -4923,7 +4929,7 @@
         </p:nvSpPr>
         <p:spPr>
           <a:xfrm rot="16200000">
-            <a:off x="956202" y="2861202"/>
+            <a:off x="424537" y="1565802"/>
             <a:ext cx="1093635" cy="346760"/>
           </a:xfrm>
           <a:prstGeom prst="rect">
@@ -4970,7 +4976,7 @@
           <a:p>
             <a:pPr algn="ctr"/>
             <a:r>
-              <a:rPr lang="en-US" sz="1050" dirty="0" err="1">
+              <a:rPr lang="en-US" sz="1050" dirty="0">
                 <a:solidFill>
                   <a:schemeClr val="bg1"/>
                 </a:solidFill>
@@ -4993,7 +4999,7 @@
         </p:nvSpPr>
         <p:spPr>
           <a:xfrm flipV="1">
-            <a:off x="1367767" y="2286001"/>
+            <a:off x="836102" y="990601"/>
             <a:ext cx="270504" cy="175523"/>
           </a:xfrm>
           <a:prstGeom prst="triangle">
@@ -5044,7 +5050,7 @@
         </p:nvCxnSpPr>
         <p:spPr>
           <a:xfrm rot="10800000" flipV="1">
-            <a:off x="1503020" y="1944303"/>
+            <a:off x="971355" y="648903"/>
             <a:ext cx="589823" cy="341697"/>
           </a:xfrm>
           <a:prstGeom prst="bentConnector2">
@@ -5086,7 +5092,7 @@
         </p:nvCxnSpPr>
         <p:spPr>
           <a:xfrm rot="16200000" flipH="1">
-            <a:off x="2226110" y="3058040"/>
+            <a:off x="1694445" y="1762640"/>
             <a:ext cx="554704" cy="174673"/>
           </a:xfrm>
           <a:prstGeom prst="bentConnector2">
@@ -5127,7 +5133,7 @@
         </p:nvCxnSpPr>
         <p:spPr>
           <a:xfrm rot="5400000">
-            <a:off x="4205956" y="1766207"/>
+            <a:off x="3674291" y="470807"/>
             <a:ext cx="804221" cy="1843806"/>
           </a:xfrm>
           <a:prstGeom prst="bentConnector2">
@@ -5168,7 +5174,7 @@
         </p:nvCxnSpPr>
         <p:spPr>
           <a:xfrm rot="16200000" flipH="1">
-            <a:off x="3430123" y="3938021"/>
+            <a:off x="2898458" y="2642621"/>
             <a:ext cx="118421" cy="699979"/>
           </a:xfrm>
           <a:prstGeom prst="bentConnector2">
@@ -5209,7 +5215,7 @@
         </p:nvCxnSpPr>
         <p:spPr>
           <a:xfrm rot="5400000">
-            <a:off x="3695875" y="2276286"/>
+            <a:off x="3164210" y="980886"/>
             <a:ext cx="1824381" cy="1843808"/>
           </a:xfrm>
           <a:prstGeom prst="bentConnector2">
@@ -5247,7 +5253,7 @@
         </p:nvSpPr>
         <p:spPr>
           <a:xfrm>
-            <a:off x="5435896" y="2743200"/>
+            <a:off x="4904231" y="1447800"/>
             <a:ext cx="229325" cy="166560"/>
           </a:xfrm>
           <a:prstGeom prst="rect">
@@ -5300,7 +5306,7 @@
         </p:nvSpPr>
         <p:spPr>
           <a:xfrm>
-            <a:off x="3687515" y="2828802"/>
+            <a:off x="3155850" y="1533402"/>
             <a:ext cx="3048000" cy="203200"/>
           </a:xfrm>
           <a:custGeom>
@@ -5382,7 +5388,7 @@
         </p:nvSpPr>
         <p:spPr>
           <a:xfrm>
-            <a:off x="5431573" y="4488138"/>
+            <a:off x="4899908" y="3192738"/>
             <a:ext cx="229325" cy="160062"/>
           </a:xfrm>
           <a:prstGeom prst="rect">
@@ -5435,7 +5441,7 @@
         </p:nvSpPr>
         <p:spPr>
           <a:xfrm flipV="1">
-            <a:off x="4114799" y="4472708"/>
+            <a:off x="3583134" y="3177308"/>
             <a:ext cx="2642195" cy="101600"/>
           </a:xfrm>
           <a:custGeom>
@@ -5472,6 +5478,108 @@
                 <a:lnTo>
                   <a:pt x="3048000" y="0"/>
                 </a:lnTo>
+              </a:path>
+            </a:pathLst>
+          </a:custGeom>
+          <a:noFill/>
+          <a:ln w="19050">
+            <a:solidFill>
+              <a:schemeClr val="accent3"/>
+            </a:solidFill>
+            <a:prstDash val="sysDot"/>
+            <a:headEnd type="none" w="med" len="med"/>
+            <a:tailEnd type="arrow" w="med" len="med"/>
+          </a:ln>
+          <a:effectLst/>
+        </p:spPr>
+        <p:style>
+          <a:lnRef idx="1">
+            <a:schemeClr val="accent2"/>
+          </a:lnRef>
+          <a:fillRef idx="2">
+            <a:schemeClr val="accent2"/>
+          </a:fillRef>
+          <a:effectRef idx="1">
+            <a:schemeClr val="accent2"/>
+          </a:effectRef>
+          <a:fontRef idx="minor">
+            <a:schemeClr val="dk1"/>
+          </a:fontRef>
+        </p:style>
+        <p:txBody>
+          <a:bodyPr rtlCol="0" anchor="ctr"/>
+          <a:lstStyle/>
+          <a:p>
+            <a:pPr algn="ctr"/>
+            <a:endParaRPr lang="en-SG"/>
+          </a:p>
+        </p:txBody>
+      </p:sp>
+      <p:sp>
+        <p:nvSpPr>
+          <p:cNvPr id="48" name="Freeform 117">
+            <a:extLst>
+              <a:ext uri="{FF2B5EF4-FFF2-40B4-BE49-F238E27FC236}">
+                <a16:creationId xmlns:a16="http://schemas.microsoft.com/office/drawing/2014/main" id="{7C156FB9-565D-4B34-9B2A-B85653DB3FAD}"/>
+              </a:ext>
+            </a:extLst>
+          </p:cNvPr>
+          <p:cNvSpPr/>
+          <p:nvPr/>
+        </p:nvSpPr>
+        <p:spPr>
+          <a:xfrm flipV="1">
+            <a:off x="3154495" y="2547889"/>
+            <a:ext cx="3049355" cy="326931"/>
+          </a:xfrm>
+          <a:custGeom>
+            <a:avLst/>
+            <a:gdLst>
+              <a:gd name="connsiteX0" fmla="*/ 0 w 3048000"/>
+              <a:gd name="connsiteY0" fmla="*/ 203200 h 203200"/>
+              <a:gd name="connsiteX1" fmla="*/ 221673 w 3048000"/>
+              <a:gd name="connsiteY1" fmla="*/ 0 h 203200"/>
+              <a:gd name="connsiteX2" fmla="*/ 3048000 w 3048000"/>
+              <a:gd name="connsiteY2" fmla="*/ 0 h 203200"/>
+              <a:gd name="connsiteX0" fmla="*/ 0 w 3048000"/>
+              <a:gd name="connsiteY0" fmla="*/ 203200 h 203200"/>
+              <a:gd name="connsiteX1" fmla="*/ 1873527 w 3048000"/>
+              <a:gd name="connsiteY1" fmla="*/ 192525 h 203200"/>
+              <a:gd name="connsiteX2" fmla="*/ 3048000 w 3048000"/>
+              <a:gd name="connsiteY2" fmla="*/ 0 h 203200"/>
+              <a:gd name="connsiteX0" fmla="*/ 0 w 3048000"/>
+              <a:gd name="connsiteY0" fmla="*/ 203327 h 203327"/>
+              <a:gd name="connsiteX1" fmla="*/ 1873527 w 3048000"/>
+              <a:gd name="connsiteY1" fmla="*/ 192652 h 203327"/>
+              <a:gd name="connsiteX2" fmla="*/ 3048000 w 3048000"/>
+              <a:gd name="connsiteY2" fmla="*/ 127 h 203327"/>
+            </a:gdLst>
+            <a:ahLst/>
+            <a:cxnLst>
+              <a:cxn ang="0">
+                <a:pos x="connsiteX0" y="connsiteY0"/>
+              </a:cxn>
+              <a:cxn ang="0">
+                <a:pos x="connsiteX1" y="connsiteY1"/>
+              </a:cxn>
+              <a:cxn ang="0">
+                <a:pos x="connsiteX2" y="connsiteY2"/>
+              </a:cxn>
+            </a:cxnLst>
+            <a:rect l="l" t="t" r="r" b="b"/>
+            <a:pathLst>
+              <a:path w="3048000" h="203327">
+                <a:moveTo>
+                  <a:pt x="0" y="203327"/>
+                </a:moveTo>
+                <a:lnTo>
+                  <a:pt x="1873527" y="192652"/>
+                </a:lnTo>
+                <a:cubicBezTo>
+                  <a:pt x="2725189" y="-11720"/>
+                  <a:pt x="2105891" y="127"/>
+                  <a:pt x="3048000" y="127"/>
+                </a:cubicBezTo>
               </a:path>
             </a:pathLst>
           </a:custGeom>

</xml_diff>